<commit_message>
statistics for documentation - presentation
</commit_message>
<xml_diff>
--- a/documentation/sharedspace/presentation.pptx
+++ b/documentation/sharedspace/presentation.pptx
@@ -6,7 +6,8 @@
   </p:sldMasterIdLst>
   <p:sldIdLst>
     <p:sldId id="256" r:id="rId2"/>
-    <p:sldId id="257" r:id="rId3"/>
+    <p:sldId id="258" r:id="rId3"/>
+    <p:sldId id="257" r:id="rId4"/>
   </p:sldIdLst>
   <p:sldSz cx="9144000" cy="6858000" type="screen4x3"/>
   <p:notesSz cx="6858000" cy="9144000"/>
@@ -205,7 +206,6 @@
           <c:smooth val="0"/>
         </c:ser>
         <c:dLbls>
-          <c:dLblPos val="t"/>
           <c:showLegendKey val="0"/>
           <c:showVal val="0"/>
           <c:showCatName val="0"/>
@@ -213,11 +213,11 @@
           <c:showPercent val="0"/>
           <c:showBubbleSize val="0"/>
         </c:dLbls>
-        <c:axId val="766226968"/>
-        <c:axId val="3693096"/>
+        <c:axId val="417155480"/>
+        <c:axId val="417161304"/>
       </c:scatterChart>
       <c:valAx>
-        <c:axId val="766226968"/>
+        <c:axId val="417155480"/>
         <c:scaling>
           <c:orientation val="minMax"/>
           <c:max val="8.0"/>
@@ -252,13 +252,13 @@
         <c:majorTickMark val="out"/>
         <c:minorTickMark val="none"/>
         <c:tickLblPos val="nextTo"/>
-        <c:crossAx val="3693096"/>
+        <c:crossAx val="417161304"/>
         <c:crosses val="autoZero"/>
         <c:crossBetween val="midCat"/>
         <c:majorUnit val="2.0"/>
       </c:valAx>
       <c:valAx>
-        <c:axId val="3693096"/>
+        <c:axId val="417161304"/>
         <c:scaling>
           <c:orientation val="minMax"/>
           <c:max val="750.0"/>
@@ -294,7 +294,7 @@
         <c:majorTickMark val="out"/>
         <c:minorTickMark val="none"/>
         <c:tickLblPos val="nextTo"/>
-        <c:crossAx val="766226968"/>
+        <c:crossAx val="417155480"/>
         <c:crosses val="autoZero"/>
         <c:crossBetween val="midCat"/>
       </c:valAx>
@@ -500,7 +500,7 @@
           <a:p>
             <a:fld id="{F3FD18E5-977A-6C4C-943A-4A1C7CD1A076}" type="datetimeFigureOut">
               <a:rPr lang="en-US" smtClean="0"/>
-              <a:t>14.01.12</a:t>
+              <a:t>16.01.12</a:t>
             </a:fld>
             <a:endParaRPr lang="en-US"/>
           </a:p>
@@ -670,7 +670,7 @@
           <a:p>
             <a:fld id="{F3FD18E5-977A-6C4C-943A-4A1C7CD1A076}" type="datetimeFigureOut">
               <a:rPr lang="en-US" smtClean="0"/>
-              <a:t>14.01.12</a:t>
+              <a:t>16.01.12</a:t>
             </a:fld>
             <a:endParaRPr lang="en-US"/>
           </a:p>
@@ -850,7 +850,7 @@
           <a:p>
             <a:fld id="{F3FD18E5-977A-6C4C-943A-4A1C7CD1A076}" type="datetimeFigureOut">
               <a:rPr lang="en-US" smtClean="0"/>
-              <a:t>14.01.12</a:t>
+              <a:t>16.01.12</a:t>
             </a:fld>
             <a:endParaRPr lang="en-US"/>
           </a:p>
@@ -1020,7 +1020,7 @@
           <a:p>
             <a:fld id="{F3FD18E5-977A-6C4C-943A-4A1C7CD1A076}" type="datetimeFigureOut">
               <a:rPr lang="en-US" smtClean="0"/>
-              <a:t>14.01.12</a:t>
+              <a:t>16.01.12</a:t>
             </a:fld>
             <a:endParaRPr lang="en-US"/>
           </a:p>
@@ -1266,7 +1266,7 @@
           <a:p>
             <a:fld id="{F3FD18E5-977A-6C4C-943A-4A1C7CD1A076}" type="datetimeFigureOut">
               <a:rPr lang="en-US" smtClean="0"/>
-              <a:t>14.01.12</a:t>
+              <a:t>16.01.12</a:t>
             </a:fld>
             <a:endParaRPr lang="en-US"/>
           </a:p>
@@ -1554,7 +1554,7 @@
           <a:p>
             <a:fld id="{F3FD18E5-977A-6C4C-943A-4A1C7CD1A076}" type="datetimeFigureOut">
               <a:rPr lang="en-US" smtClean="0"/>
-              <a:t>14.01.12</a:t>
+              <a:t>16.01.12</a:t>
             </a:fld>
             <a:endParaRPr lang="en-US"/>
           </a:p>
@@ -1976,7 +1976,7 @@
           <a:p>
             <a:fld id="{F3FD18E5-977A-6C4C-943A-4A1C7CD1A076}" type="datetimeFigureOut">
               <a:rPr lang="en-US" smtClean="0"/>
-              <a:t>14.01.12</a:t>
+              <a:t>16.01.12</a:t>
             </a:fld>
             <a:endParaRPr lang="en-US"/>
           </a:p>
@@ -2094,7 +2094,7 @@
           <a:p>
             <a:fld id="{F3FD18E5-977A-6C4C-943A-4A1C7CD1A076}" type="datetimeFigureOut">
               <a:rPr lang="en-US" smtClean="0"/>
-              <a:t>14.01.12</a:t>
+              <a:t>16.01.12</a:t>
             </a:fld>
             <a:endParaRPr lang="en-US"/>
           </a:p>
@@ -2189,7 +2189,7 @@
           <a:p>
             <a:fld id="{F3FD18E5-977A-6C4C-943A-4A1C7CD1A076}" type="datetimeFigureOut">
               <a:rPr lang="en-US" smtClean="0"/>
-              <a:t>14.01.12</a:t>
+              <a:t>16.01.12</a:t>
             </a:fld>
             <a:endParaRPr lang="en-US"/>
           </a:p>
@@ -2466,7 +2466,7 @@
           <a:p>
             <a:fld id="{F3FD18E5-977A-6C4C-943A-4A1C7CD1A076}" type="datetimeFigureOut">
               <a:rPr lang="en-US" smtClean="0"/>
-              <a:t>14.01.12</a:t>
+              <a:t>16.01.12</a:t>
             </a:fld>
             <a:endParaRPr lang="en-US"/>
           </a:p>
@@ -2719,7 +2719,7 @@
           <a:p>
             <a:fld id="{F3FD18E5-977A-6C4C-943A-4A1C7CD1A076}" type="datetimeFigureOut">
               <a:rPr lang="en-US" smtClean="0"/>
-              <a:t>14.01.12</a:t>
+              <a:t>16.01.12</a:t>
             </a:fld>
             <a:endParaRPr lang="en-US"/>
           </a:p>
@@ -2932,7 +2932,7 @@
           <a:p>
             <a:fld id="{F3FD18E5-977A-6C4C-943A-4A1C7CD1A076}" type="datetimeFigureOut">
               <a:rPr lang="en-US" smtClean="0"/>
-              <a:t>14.01.12</a:t>
+              <a:t>16.01.12</a:t>
             </a:fld>
             <a:endParaRPr lang="en-US"/>
           </a:p>
@@ -3395,6 +3395,525 @@
 </file>
 
 <file path=ppt/slides/slide2.xml><?xml version="1.0" encoding="utf-8"?>
+<p:sld xmlns:a="http://schemas.openxmlformats.org/drawingml/2006/main" xmlns:r="http://schemas.openxmlformats.org/officeDocument/2006/relationships" xmlns:p="http://schemas.openxmlformats.org/presentationml/2006/main">
+  <p:cSld>
+    <p:spTree>
+      <p:nvGrpSpPr>
+        <p:cNvPr id="1" name=""/>
+        <p:cNvGrpSpPr/>
+        <p:nvPr/>
+      </p:nvGrpSpPr>
+      <p:grpSpPr>
+        <a:xfrm>
+          <a:off x="0" y="0"/>
+          <a:ext cx="0" cy="0"/>
+          <a:chOff x="0" y="0"/>
+          <a:chExt cx="0" cy="0"/>
+        </a:xfrm>
+      </p:grpSpPr>
+      <p:sp>
+        <p:nvSpPr>
+          <p:cNvPr id="2" name="Title 1"/>
+          <p:cNvSpPr>
+            <a:spLocks noGrp="1"/>
+          </p:cNvSpPr>
+          <p:nvPr>
+            <p:ph type="title"/>
+          </p:nvPr>
+        </p:nvSpPr>
+        <p:spPr/>
+        <p:txBody>
+          <a:bodyPr/>
+          <a:lstStyle/>
+          <a:p>
+            <a:r>
+              <a:rPr lang="en-US" dirty="0" err="1" smtClean="0"/>
+              <a:t>Statistik</a:t>
+            </a:r>
+            <a:endParaRPr lang="en-US" dirty="0"/>
+          </a:p>
+        </p:txBody>
+      </p:sp>
+      <p:graphicFrame>
+        <p:nvGraphicFramePr>
+          <p:cNvPr id="4" name="Content Placeholder 3"/>
+          <p:cNvGraphicFramePr>
+            <a:graphicFrameLocks noGrp="1"/>
+          </p:cNvGraphicFramePr>
+          <p:nvPr>
+            <p:ph idx="1"/>
+            <p:extLst>
+              <p:ext uri="{D42A27DB-BD31-4B8C-83A1-F6EECF244321}">
+                <p14:modId xmlns:p14="http://schemas.microsoft.com/office/powerpoint/2010/main" val="2698538328"/>
+              </p:ext>
+            </p:extLst>
+          </p:nvPr>
+        </p:nvGraphicFramePr>
+        <p:xfrm>
+          <a:off x="457200" y="1600200"/>
+          <a:ext cx="8229600" cy="3337560"/>
+        </p:xfrm>
+        <a:graphic>
+          <a:graphicData uri="http://schemas.openxmlformats.org/drawingml/2006/table">
+            <a:tbl>
+              <a:tblPr firstRow="1" bandRow="1">
+                <a:tableStyleId>{D7AC3CCA-C797-4891-BE02-D94E43425B78}</a:tableStyleId>
+              </a:tblPr>
+              <a:tblGrid>
+                <a:gridCol w="3728024"/>
+                <a:gridCol w="1758376"/>
+                <a:gridCol w="2743200"/>
+              </a:tblGrid>
+              <a:tr h="370840">
+                <a:tc>
+                  <a:txBody>
+                    <a:bodyPr/>
+                    <a:lstStyle/>
+                    <a:p>
+                      <a:r>
+                        <a:rPr lang="en-US" dirty="0" smtClean="0"/>
+                        <a:t>Task</a:t>
+                      </a:r>
+                      <a:endParaRPr lang="en-US" dirty="0"/>
+                    </a:p>
+                  </a:txBody>
+                  <a:tcPr/>
+                </a:tc>
+                <a:tc>
+                  <a:txBody>
+                    <a:bodyPr/>
+                    <a:lstStyle/>
+                    <a:p>
+                      <a:r>
+                        <a:rPr lang="en-US" dirty="0" err="1" smtClean="0"/>
+                        <a:t>Aufwand</a:t>
+                      </a:r>
+                      <a:r>
+                        <a:rPr lang="en-US" baseline="0" dirty="0" smtClean="0"/>
+                        <a:t> (h)</a:t>
+                      </a:r>
+                      <a:endParaRPr lang="en-US" dirty="0"/>
+                    </a:p>
+                  </a:txBody>
+                  <a:tcPr/>
+                </a:tc>
+                <a:tc>
+                  <a:txBody>
+                    <a:bodyPr/>
+                    <a:lstStyle/>
+                    <a:p>
+                      <a:r>
+                        <a:rPr lang="en-US" dirty="0" smtClean="0"/>
+                        <a:t>LOCs</a:t>
+                      </a:r>
+                      <a:endParaRPr lang="en-US" dirty="0"/>
+                    </a:p>
+                  </a:txBody>
+                  <a:tcPr/>
+                </a:tc>
+              </a:tr>
+              <a:tr h="370840">
+                <a:tc>
+                  <a:txBody>
+                    <a:bodyPr/>
+                    <a:lstStyle/>
+                    <a:p>
+                      <a:r>
+                        <a:rPr lang="en-US" dirty="0" smtClean="0"/>
+                        <a:t>1.1 GUI/Logic/Architecture</a:t>
+                      </a:r>
+                      <a:endParaRPr lang="en-US" dirty="0"/>
+                    </a:p>
+                  </a:txBody>
+                  <a:tcPr/>
+                </a:tc>
+                <a:tc>
+                  <a:txBody>
+                    <a:bodyPr/>
+                    <a:lstStyle/>
+                    <a:p>
+                      <a:r>
+                        <a:rPr lang="en-US" dirty="0" smtClean="0"/>
+                        <a:t>15</a:t>
+                      </a:r>
+                      <a:endParaRPr lang="en-US" dirty="0"/>
+                    </a:p>
+                  </a:txBody>
+                  <a:tcPr/>
+                </a:tc>
+                <a:tc>
+                  <a:txBody>
+                    <a:bodyPr/>
+                    <a:lstStyle/>
+                    <a:p>
+                      <a:r>
+                        <a:rPr lang="en-US" dirty="0" smtClean="0"/>
+                        <a:t>1590 (44% von </a:t>
+                      </a:r>
+                      <a:r>
+                        <a:rPr lang="en-US" dirty="0" err="1" smtClean="0"/>
+                        <a:t>Bsp</a:t>
+                      </a:r>
+                      <a:r>
+                        <a:rPr lang="en-US" dirty="0" smtClean="0"/>
+                        <a:t>. 1)</a:t>
+                      </a:r>
+                      <a:endParaRPr lang="en-US" dirty="0"/>
+                    </a:p>
+                  </a:txBody>
+                  <a:tcPr/>
+                </a:tc>
+              </a:tr>
+              <a:tr h="370840">
+                <a:tc>
+                  <a:txBody>
+                    <a:bodyPr/>
+                    <a:lstStyle/>
+                    <a:p>
+                      <a:r>
+                        <a:rPr lang="en-US" dirty="0" smtClean="0"/>
+                        <a:t>1.2 Mozart-</a:t>
+                      </a:r>
+                      <a:r>
+                        <a:rPr lang="en-US" dirty="0" err="1" smtClean="0"/>
+                        <a:t>Implementierung</a:t>
+                      </a:r>
+                      <a:endParaRPr lang="en-US" dirty="0"/>
+                    </a:p>
+                  </a:txBody>
+                  <a:tcPr/>
+                </a:tc>
+                <a:tc>
+                  <a:txBody>
+                    <a:bodyPr/>
+                    <a:lstStyle/>
+                    <a:p>
+                      <a:r>
+                        <a:rPr lang="en-US" dirty="0" smtClean="0"/>
+                        <a:t>20</a:t>
+                      </a:r>
+                      <a:endParaRPr lang="en-US" dirty="0"/>
+                    </a:p>
+                  </a:txBody>
+                  <a:tcPr/>
+                </a:tc>
+                <a:tc>
+                  <a:txBody>
+                    <a:bodyPr/>
+                    <a:lstStyle/>
+                    <a:p>
+                      <a:r>
+                        <a:rPr lang="en-US" dirty="0" smtClean="0"/>
+                        <a:t>1137 (31% von </a:t>
+                      </a:r>
+                      <a:r>
+                        <a:rPr lang="en-US" dirty="0" err="1" smtClean="0"/>
+                        <a:t>Bsp</a:t>
+                      </a:r>
+                      <a:r>
+                        <a:rPr lang="en-US" dirty="0" smtClean="0"/>
+                        <a:t>. 1)</a:t>
+                      </a:r>
+                      <a:endParaRPr lang="en-US" dirty="0"/>
+                    </a:p>
+                  </a:txBody>
+                  <a:tcPr/>
+                </a:tc>
+              </a:tr>
+              <a:tr h="370840">
+                <a:tc>
+                  <a:txBody>
+                    <a:bodyPr/>
+                    <a:lstStyle/>
+                    <a:p>
+                      <a:r>
+                        <a:rPr lang="en-US" dirty="0" smtClean="0"/>
+                        <a:t>1.3</a:t>
+                      </a:r>
+                      <a:r>
+                        <a:rPr lang="en-US" baseline="0" dirty="0" smtClean="0"/>
+                        <a:t> </a:t>
+                      </a:r>
+                      <a:r>
+                        <a:rPr lang="en-US" baseline="0" dirty="0" err="1" smtClean="0"/>
+                        <a:t>Alternativ-Implementierung</a:t>
+                      </a:r>
+                      <a:endParaRPr lang="en-US" dirty="0"/>
+                    </a:p>
+                  </a:txBody>
+                  <a:tcPr/>
+                </a:tc>
+                <a:tc>
+                  <a:txBody>
+                    <a:bodyPr/>
+                    <a:lstStyle/>
+                    <a:p>
+                      <a:endParaRPr lang="en-US" dirty="0"/>
+                    </a:p>
+                  </a:txBody>
+                  <a:tcPr/>
+                </a:tc>
+                <a:tc>
+                  <a:txBody>
+                    <a:bodyPr/>
+                    <a:lstStyle/>
+                    <a:p>
+                      <a:r>
+                        <a:rPr lang="en-US" dirty="0" smtClean="0"/>
+                        <a:t>920 (25% von </a:t>
+                      </a:r>
+                      <a:r>
+                        <a:rPr lang="en-US" dirty="0" err="1" smtClean="0"/>
+                        <a:t>Bsp</a:t>
+                      </a:r>
+                      <a:r>
+                        <a:rPr lang="en-US" dirty="0" smtClean="0"/>
+                        <a:t>. 1)</a:t>
+                      </a:r>
+                      <a:endParaRPr lang="en-US" dirty="0"/>
+                    </a:p>
+                  </a:txBody>
+                  <a:tcPr/>
+                </a:tc>
+              </a:tr>
+              <a:tr h="370840">
+                <a:tc>
+                  <a:txBody>
+                    <a:bodyPr/>
+                    <a:lstStyle/>
+                    <a:p>
+                      <a:r>
+                        <a:rPr lang="en-US" dirty="0" smtClean="0"/>
+                        <a:t>2.1 GUI/Logic/Architecture</a:t>
+                      </a:r>
+                      <a:endParaRPr lang="en-US" dirty="0"/>
+                    </a:p>
+                  </a:txBody>
+                  <a:tcPr/>
+                </a:tc>
+                <a:tc>
+                  <a:txBody>
+                    <a:bodyPr/>
+                    <a:lstStyle/>
+                    <a:p>
+                      <a:r>
+                        <a:rPr lang="en-US" dirty="0" smtClean="0"/>
+                        <a:t>12</a:t>
+                      </a:r>
+                      <a:endParaRPr lang="en-US" dirty="0"/>
+                    </a:p>
+                  </a:txBody>
+                  <a:tcPr/>
+                </a:tc>
+                <a:tc>
+                  <a:txBody>
+                    <a:bodyPr/>
+                    <a:lstStyle/>
+                    <a:p>
+                      <a:endParaRPr lang="en-US" dirty="0"/>
+                    </a:p>
+                  </a:txBody>
+                  <a:tcPr/>
+                </a:tc>
+              </a:tr>
+              <a:tr h="370840">
+                <a:tc>
+                  <a:txBody>
+                    <a:bodyPr/>
+                    <a:lstStyle/>
+                    <a:p>
+                      <a:r>
+                        <a:rPr lang="en-US" dirty="0" smtClean="0"/>
+                        <a:t>2.2</a:t>
+                      </a:r>
+                      <a:r>
+                        <a:rPr lang="en-US" baseline="0" dirty="0" smtClean="0"/>
+                        <a:t> Mozart-</a:t>
+                      </a:r>
+                      <a:r>
+                        <a:rPr lang="en-US" baseline="0" dirty="0" err="1" smtClean="0"/>
+                        <a:t>Implementierung</a:t>
+                      </a:r>
+                      <a:endParaRPr lang="en-US" dirty="0"/>
+                    </a:p>
+                  </a:txBody>
+                  <a:tcPr/>
+                </a:tc>
+                <a:tc>
+                  <a:txBody>
+                    <a:bodyPr/>
+                    <a:lstStyle/>
+                    <a:p>
+                      <a:r>
+                        <a:rPr lang="en-US" dirty="0" smtClean="0"/>
+                        <a:t>10</a:t>
+                      </a:r>
+                      <a:endParaRPr lang="en-US" dirty="0"/>
+                    </a:p>
+                  </a:txBody>
+                  <a:tcPr/>
+                </a:tc>
+                <a:tc>
+                  <a:txBody>
+                    <a:bodyPr/>
+                    <a:lstStyle/>
+                    <a:p>
+                      <a:endParaRPr lang="en-US" dirty="0"/>
+                    </a:p>
+                  </a:txBody>
+                  <a:tcPr/>
+                </a:tc>
+              </a:tr>
+              <a:tr h="370840">
+                <a:tc>
+                  <a:txBody>
+                    <a:bodyPr/>
+                    <a:lstStyle/>
+                    <a:p>
+                      <a:r>
+                        <a:rPr lang="en-US" dirty="0" smtClean="0"/>
+                        <a:t>2.3 </a:t>
+                      </a:r>
+                      <a:r>
+                        <a:rPr lang="en-US" dirty="0" err="1" smtClean="0"/>
+                        <a:t>Alternativ-Implementierung</a:t>
+                      </a:r>
+                      <a:endParaRPr lang="en-US" dirty="0"/>
+                    </a:p>
+                  </a:txBody>
+                  <a:tcPr/>
+                </a:tc>
+                <a:tc>
+                  <a:txBody>
+                    <a:bodyPr/>
+                    <a:lstStyle/>
+                    <a:p>
+                      <a:endParaRPr lang="en-US" dirty="0"/>
+                    </a:p>
+                  </a:txBody>
+                  <a:tcPr/>
+                </a:tc>
+                <a:tc>
+                  <a:txBody>
+                    <a:bodyPr/>
+                    <a:lstStyle/>
+                    <a:p>
+                      <a:endParaRPr lang="en-US"/>
+                    </a:p>
+                  </a:txBody>
+                  <a:tcPr/>
+                </a:tc>
+              </a:tr>
+              <a:tr h="370840">
+                <a:tc>
+                  <a:txBody>
+                    <a:bodyPr/>
+                    <a:lstStyle/>
+                    <a:p>
+                      <a:r>
+                        <a:rPr lang="en-US" dirty="0" smtClean="0"/>
+                        <a:t>2.4 Benchmark (</a:t>
+                      </a:r>
+                      <a:r>
+                        <a:rPr lang="en-US" dirty="0" err="1" smtClean="0"/>
+                        <a:t>nur</a:t>
+                      </a:r>
+                      <a:r>
+                        <a:rPr lang="en-US" baseline="0" dirty="0" smtClean="0"/>
+                        <a:t> Mozart)</a:t>
+                      </a:r>
+                      <a:endParaRPr lang="en-US" dirty="0"/>
+                    </a:p>
+                  </a:txBody>
+                  <a:tcPr/>
+                </a:tc>
+                <a:tc>
+                  <a:txBody>
+                    <a:bodyPr/>
+                    <a:lstStyle/>
+                    <a:p>
+                      <a:r>
+                        <a:rPr lang="en-US" dirty="0" smtClean="0"/>
+                        <a:t>8</a:t>
+                      </a:r>
+                      <a:endParaRPr lang="en-US" dirty="0"/>
+                    </a:p>
+                  </a:txBody>
+                  <a:tcPr/>
+                </a:tc>
+                <a:tc>
+                  <a:txBody>
+                    <a:bodyPr/>
+                    <a:lstStyle/>
+                    <a:p>
+                      <a:endParaRPr lang="en-US"/>
+                    </a:p>
+                  </a:txBody>
+                  <a:tcPr/>
+                </a:tc>
+              </a:tr>
+              <a:tr h="370840">
+                <a:tc>
+                  <a:txBody>
+                    <a:bodyPr/>
+                    <a:lstStyle/>
+                    <a:p>
+                      <a:r>
+                        <a:rPr lang="en-US" dirty="0" smtClean="0"/>
+                        <a:t>3 </a:t>
+                      </a:r>
+                      <a:r>
+                        <a:rPr lang="en-US" dirty="0" err="1" smtClean="0"/>
+                        <a:t>Dokumentation</a:t>
+                      </a:r>
+                      <a:endParaRPr lang="en-US" dirty="0"/>
+                    </a:p>
+                  </a:txBody>
+                  <a:tcPr/>
+                </a:tc>
+                <a:tc>
+                  <a:txBody>
+                    <a:bodyPr/>
+                    <a:lstStyle/>
+                    <a:p>
+                      <a:r>
+                        <a:rPr lang="en-US" dirty="0" smtClean="0"/>
+                        <a:t>5</a:t>
+                      </a:r>
+                      <a:endParaRPr lang="en-US" dirty="0"/>
+                    </a:p>
+                  </a:txBody>
+                  <a:tcPr/>
+                </a:tc>
+                <a:tc>
+                  <a:txBody>
+                    <a:bodyPr/>
+                    <a:lstStyle/>
+                    <a:p>
+                      <a:endParaRPr lang="en-US" dirty="0"/>
+                    </a:p>
+                  </a:txBody>
+                  <a:tcPr/>
+                </a:tc>
+              </a:tr>
+            </a:tbl>
+          </a:graphicData>
+        </a:graphic>
+      </p:graphicFrame>
+    </p:spTree>
+    <p:extLst>
+      <p:ext uri="{BB962C8B-B14F-4D97-AF65-F5344CB8AC3E}">
+        <p14:creationId xmlns:p14="http://schemas.microsoft.com/office/powerpoint/2010/main" val="1986570536"/>
+      </p:ext>
+    </p:extLst>
+  </p:cSld>
+  <p:clrMapOvr>
+    <a:masterClrMapping/>
+  </p:clrMapOvr>
+</p:sld>
+</file>
+
+<file path=ppt/slides/slide3.xml><?xml version="1.0" encoding="utf-8"?>
 <p:sld xmlns:a="http://schemas.openxmlformats.org/drawingml/2006/main" xmlns:r="http://schemas.openxmlformats.org/officeDocument/2006/relationships" xmlns:p="http://schemas.openxmlformats.org/presentationml/2006/main">
   <p:cSld>
     <p:spTree>

</xml_diff>

<commit_message>
new graphics added to presentation
</commit_message>
<xml_diff>
--- a/documentation/sharedspace/presentation.pptx
+++ b/documentation/sharedspace/presentation.pptx
@@ -6,8 +6,10 @@
   </p:sldMasterIdLst>
   <p:sldIdLst>
     <p:sldId id="256" r:id="rId2"/>
-    <p:sldId id="258" r:id="rId3"/>
-    <p:sldId id="257" r:id="rId4"/>
+    <p:sldId id="259" r:id="rId3"/>
+    <p:sldId id="261" r:id="rId4"/>
+    <p:sldId id="257" r:id="rId5"/>
+    <p:sldId id="258" r:id="rId6"/>
   </p:sldIdLst>
   <p:sldSz cx="9144000" cy="6858000" type="screen4x3"/>
   <p:notesSz cx="6858000" cy="9144000"/>
@@ -213,11 +215,11 @@
           <c:showPercent val="0"/>
           <c:showBubbleSize val="0"/>
         </c:dLbls>
-        <c:axId val="417155480"/>
-        <c:axId val="417161304"/>
+        <c:axId val="504719960"/>
+        <c:axId val="504725640"/>
       </c:scatterChart>
       <c:valAx>
-        <c:axId val="417155480"/>
+        <c:axId val="504719960"/>
         <c:scaling>
           <c:orientation val="minMax"/>
           <c:max val="8.0"/>
@@ -252,13 +254,13 @@
         <c:majorTickMark val="out"/>
         <c:minorTickMark val="none"/>
         <c:tickLblPos val="nextTo"/>
-        <c:crossAx val="417161304"/>
+        <c:crossAx val="504725640"/>
         <c:crosses val="autoZero"/>
         <c:crossBetween val="midCat"/>
         <c:majorUnit val="2.0"/>
       </c:valAx>
       <c:valAx>
-        <c:axId val="417161304"/>
+        <c:axId val="504725640"/>
         <c:scaling>
           <c:orientation val="minMax"/>
           <c:max val="750.0"/>
@@ -294,7 +296,7 @@
         <c:majorTickMark val="out"/>
         <c:minorTickMark val="none"/>
         <c:tickLblPos val="nextTo"/>
-        <c:crossAx val="417155480"/>
+        <c:crossAx val="504719960"/>
         <c:crosses val="autoZero"/>
         <c:crossBetween val="midCat"/>
       </c:valAx>
@@ -3391,10 +3393,872 @@
   <p:clrMapOvr>
     <a:masterClrMapping/>
   </p:clrMapOvr>
+  <p:timing>
+    <p:tnLst>
+      <p:par>
+        <p:cTn xmlns:p14="http://schemas.microsoft.com/office/powerpoint/2010/main" id="1" dur="indefinite" restart="never" nodeType="tmRoot"/>
+      </p:par>
+    </p:tnLst>
+  </p:timing>
 </p:sld>
 </file>
 
 <file path=ppt/slides/slide2.xml><?xml version="1.0" encoding="utf-8"?>
+<p:sld xmlns:a="http://schemas.openxmlformats.org/drawingml/2006/main" xmlns:r="http://schemas.openxmlformats.org/officeDocument/2006/relationships" xmlns:p="http://schemas.openxmlformats.org/presentationml/2006/main">
+  <p:cSld>
+    <p:spTree>
+      <p:nvGrpSpPr>
+        <p:cNvPr id="1" name=""/>
+        <p:cNvGrpSpPr/>
+        <p:nvPr/>
+      </p:nvGrpSpPr>
+      <p:grpSpPr>
+        <a:xfrm>
+          <a:off x="0" y="0"/>
+          <a:ext cx="0" cy="0"/>
+          <a:chOff x="0" y="0"/>
+          <a:chExt cx="0" cy="0"/>
+        </a:xfrm>
+      </p:grpSpPr>
+      <p:pic>
+        <p:nvPicPr>
+          <p:cNvPr id="6" name="Picture 5" descr="shared_space_bsp2.png"/>
+          <p:cNvPicPr>
+            <a:picLocks noChangeAspect="1"/>
+          </p:cNvPicPr>
+          <p:nvPr/>
+        </p:nvPicPr>
+        <p:blipFill>
+          <a:blip r:embed="rId2">
+            <a:extLst>
+              <a:ext uri="{28A0092B-C50C-407E-A947-70E740481C1C}">
+                <a14:useLocalDpi xmlns:a14="http://schemas.microsoft.com/office/drawing/2010/main" val="0"/>
+              </a:ext>
+            </a:extLst>
+          </a:blip>
+          <a:stretch>
+            <a:fillRect/>
+          </a:stretch>
+        </p:blipFill>
+        <p:spPr>
+          <a:xfrm>
+            <a:off x="593458" y="0"/>
+            <a:ext cx="8168416" cy="6858000"/>
+          </a:xfrm>
+          <a:prstGeom prst="rect">
+            <a:avLst/>
+          </a:prstGeom>
+        </p:spPr>
+      </p:pic>
+      <p:sp>
+        <p:nvSpPr>
+          <p:cNvPr id="7" name="Title 6"/>
+          <p:cNvSpPr>
+            <a:spLocks noGrp="1"/>
+          </p:cNvSpPr>
+          <p:nvPr>
+            <p:ph type="title"/>
+          </p:nvPr>
+        </p:nvSpPr>
+        <p:spPr/>
+        <p:txBody>
+          <a:bodyPr/>
+          <a:lstStyle/>
+          <a:p>
+            <a:endParaRPr lang="en-US"/>
+          </a:p>
+        </p:txBody>
+      </p:sp>
+    </p:spTree>
+    <p:extLst>
+      <p:ext uri="{BB962C8B-B14F-4D97-AF65-F5344CB8AC3E}">
+        <p14:creationId xmlns:p14="http://schemas.microsoft.com/office/powerpoint/2010/main" val="4047370534"/>
+      </p:ext>
+    </p:extLst>
+  </p:cSld>
+  <p:clrMapOvr>
+    <a:masterClrMapping/>
+  </p:clrMapOvr>
+  <p:timing>
+    <p:tnLst>
+      <p:par>
+        <p:cTn xmlns:p14="http://schemas.microsoft.com/office/powerpoint/2010/main" id="1" dur="indefinite" restart="never" nodeType="tmRoot"/>
+      </p:par>
+    </p:tnLst>
+  </p:timing>
+</p:sld>
+</file>
+
+<file path=ppt/slides/slide3.xml><?xml version="1.0" encoding="utf-8"?>
+<p:sld xmlns:a="http://schemas.openxmlformats.org/drawingml/2006/main" xmlns:r="http://schemas.openxmlformats.org/officeDocument/2006/relationships" xmlns:p="http://schemas.openxmlformats.org/presentationml/2006/main">
+  <p:cSld>
+    <p:spTree>
+      <p:nvGrpSpPr>
+        <p:cNvPr id="1" name=""/>
+        <p:cNvGrpSpPr/>
+        <p:nvPr/>
+      </p:nvGrpSpPr>
+      <p:grpSpPr>
+        <a:xfrm>
+          <a:off x="0" y="0"/>
+          <a:ext cx="0" cy="0"/>
+          <a:chOff x="0" y="0"/>
+          <a:chExt cx="0" cy="0"/>
+        </a:xfrm>
+      </p:grpSpPr>
+      <p:pic>
+        <p:nvPicPr>
+          <p:cNvPr id="4" name="Picture 3" descr="load_balancer.png"/>
+          <p:cNvPicPr>
+            <a:picLocks noChangeAspect="1"/>
+          </p:cNvPicPr>
+          <p:nvPr/>
+        </p:nvPicPr>
+        <p:blipFill>
+          <a:blip r:embed="rId2">
+            <a:extLst>
+              <a:ext uri="{28A0092B-C50C-407E-A947-70E740481C1C}">
+                <a14:useLocalDpi xmlns:a14="http://schemas.microsoft.com/office/drawing/2010/main" val="0"/>
+              </a:ext>
+            </a:extLst>
+          </a:blip>
+          <a:stretch>
+            <a:fillRect/>
+          </a:stretch>
+        </p:blipFill>
+        <p:spPr>
+          <a:xfrm>
+            <a:off x="3119337" y="1618275"/>
+            <a:ext cx="5968473" cy="3995343"/>
+          </a:xfrm>
+          <a:prstGeom prst="rect">
+            <a:avLst/>
+          </a:prstGeom>
+        </p:spPr>
+      </p:pic>
+      <p:sp>
+        <p:nvSpPr>
+          <p:cNvPr id="2" name="Title 1"/>
+          <p:cNvSpPr>
+            <a:spLocks noGrp="1"/>
+          </p:cNvSpPr>
+          <p:nvPr>
+            <p:ph type="title"/>
+          </p:nvPr>
+        </p:nvSpPr>
+        <p:spPr/>
+        <p:txBody>
+          <a:bodyPr/>
+          <a:lstStyle/>
+          <a:p>
+            <a:r>
+              <a:rPr lang="en-US" dirty="0" smtClean="0"/>
+              <a:t>Shared Space </a:t>
+            </a:r>
+            <a:r>
+              <a:rPr lang="en-US" dirty="0" smtClean="0"/>
+              <a:t>–</a:t>
+            </a:r>
+            <a:r>
+              <a:rPr lang="en-US" dirty="0" smtClean="0"/>
+              <a:t> Load Balancing</a:t>
+            </a:r>
+            <a:endParaRPr lang="en-US" dirty="0"/>
+          </a:p>
+        </p:txBody>
+      </p:sp>
+      <p:sp>
+        <p:nvSpPr>
+          <p:cNvPr id="3" name="Content Placeholder 2"/>
+          <p:cNvSpPr>
+            <a:spLocks noGrp="1"/>
+          </p:cNvSpPr>
+          <p:nvPr>
+            <p:ph idx="1"/>
+          </p:nvPr>
+        </p:nvSpPr>
+        <p:spPr>
+          <a:xfrm>
+            <a:off x="457200" y="1600200"/>
+            <a:ext cx="2993048" cy="4525963"/>
+          </a:xfrm>
+        </p:spPr>
+        <p:txBody>
+          <a:bodyPr>
+            <a:normAutofit/>
+          </a:bodyPr>
+          <a:lstStyle/>
+          <a:p>
+            <a:r>
+              <a:rPr lang="en-US" sz="2000" dirty="0" smtClean="0"/>
+              <a:t>Load Balancer </a:t>
+            </a:r>
+            <a:r>
+              <a:rPr lang="en-US" sz="2000" dirty="0" err="1" smtClean="0"/>
+              <a:t>pollt</a:t>
+            </a:r>
+            <a:r>
+              <a:rPr lang="en-US" sz="2000" dirty="0" smtClean="0"/>
+              <a:t> </a:t>
+            </a:r>
+            <a:r>
+              <a:rPr lang="en-US" sz="2000" dirty="0" err="1" smtClean="0"/>
+              <a:t>sekündlich</a:t>
+            </a:r>
+            <a:r>
+              <a:rPr lang="en-US" sz="2000" dirty="0" smtClean="0"/>
+              <a:t> die </a:t>
+            </a:r>
+            <a:r>
+              <a:rPr lang="en-US" sz="2000" dirty="0" err="1" smtClean="0"/>
+              <a:t>Anzahl</a:t>
+            </a:r>
+            <a:r>
+              <a:rPr lang="en-US" sz="2000" dirty="0" smtClean="0"/>
+              <a:t> der </a:t>
+            </a:r>
+            <a:r>
+              <a:rPr lang="en-US" sz="2000" dirty="0" err="1" smtClean="0"/>
+              <a:t>Teile</a:t>
+            </a:r>
+            <a:r>
+              <a:rPr lang="en-US" sz="2000" dirty="0" smtClean="0"/>
+              <a:t> in </a:t>
+            </a:r>
+            <a:r>
+              <a:rPr lang="en-US" sz="2000" dirty="0" err="1" smtClean="0"/>
+              <a:t>allen</a:t>
+            </a:r>
+            <a:r>
+              <a:rPr lang="en-US" sz="2000" dirty="0" smtClean="0"/>
+              <a:t> Factories</a:t>
+            </a:r>
+          </a:p>
+          <a:p>
+            <a:r>
+              <a:rPr lang="en-US" sz="2000" dirty="0" smtClean="0"/>
+              <a:t>Factory 2 hat </a:t>
+            </a:r>
+            <a:r>
+              <a:rPr lang="en-US" sz="2000" dirty="0" err="1" smtClean="0"/>
+              <a:t>weniger</a:t>
+            </a:r>
+            <a:r>
+              <a:rPr lang="en-US" sz="2000" dirty="0" smtClean="0"/>
+              <a:t> </a:t>
+            </a:r>
+            <a:r>
+              <a:rPr lang="en-US" sz="2000" dirty="0" err="1" smtClean="0"/>
+              <a:t>als</a:t>
+            </a:r>
+            <a:r>
+              <a:rPr lang="en-US" sz="2000" dirty="0" smtClean="0"/>
+              <a:t> 50 CPU’s </a:t>
+            </a:r>
+            <a:r>
+              <a:rPr lang="en-US" sz="2000" dirty="0" err="1" smtClean="0"/>
+              <a:t>übrig</a:t>
+            </a:r>
+            <a:endParaRPr lang="en-US" sz="2000" dirty="0" smtClean="0"/>
+          </a:p>
+          <a:p>
+            <a:r>
+              <a:rPr lang="en-US" sz="2000" dirty="0" err="1" smtClean="0"/>
+              <a:t>Suche</a:t>
+            </a:r>
+            <a:r>
+              <a:rPr lang="en-US" sz="2000" dirty="0" smtClean="0"/>
+              <a:t> </a:t>
+            </a:r>
+            <a:r>
+              <a:rPr lang="en-US" sz="2000" dirty="0" err="1" smtClean="0"/>
+              <a:t>andere</a:t>
+            </a:r>
+            <a:r>
+              <a:rPr lang="en-US" sz="2000" dirty="0" smtClean="0"/>
+              <a:t> Factory </a:t>
+            </a:r>
+            <a:r>
+              <a:rPr lang="en-US" sz="2000" dirty="0" err="1" smtClean="0"/>
+              <a:t>mit</a:t>
+            </a:r>
+            <a:r>
+              <a:rPr lang="en-US" sz="2000" dirty="0" smtClean="0"/>
+              <a:t> </a:t>
+            </a:r>
+            <a:r>
+              <a:rPr lang="en-US" sz="2000" dirty="0" err="1" smtClean="0"/>
+              <a:t>maximaler</a:t>
+            </a:r>
+            <a:r>
+              <a:rPr lang="en-US" sz="2000" dirty="0" smtClean="0"/>
+              <a:t> </a:t>
+            </a:r>
+            <a:r>
+              <a:rPr lang="en-US" sz="2000" dirty="0" err="1" smtClean="0"/>
+              <a:t>Anzahl</a:t>
+            </a:r>
+            <a:r>
+              <a:rPr lang="en-US" sz="2000" dirty="0" smtClean="0"/>
+              <a:t> an CPU’s </a:t>
+            </a:r>
+            <a:r>
+              <a:rPr lang="en-US" sz="2000" dirty="0" smtClean="0">
+                <a:sym typeface="Wingdings"/>
+              </a:rPr>
+              <a:t> Factory 1</a:t>
+            </a:r>
+            <a:endParaRPr lang="en-US" sz="2000" dirty="0" smtClean="0"/>
+          </a:p>
+          <a:p>
+            <a:r>
+              <a:rPr lang="en-US" sz="2000" dirty="0" err="1" smtClean="0"/>
+              <a:t>Transferiere</a:t>
+            </a:r>
+            <a:r>
+              <a:rPr lang="en-US" sz="2000" dirty="0" smtClean="0"/>
+              <a:t> die </a:t>
+            </a:r>
+            <a:r>
+              <a:rPr lang="en-US" sz="2000" dirty="0" err="1" smtClean="0"/>
+              <a:t>Hälfte</a:t>
+            </a:r>
+            <a:r>
+              <a:rPr lang="en-US" sz="2000" dirty="0" smtClean="0"/>
+              <a:t> der CPU’s von Factory 1 </a:t>
+            </a:r>
+            <a:r>
+              <a:rPr lang="en-US" sz="2000" dirty="0" err="1" smtClean="0"/>
+              <a:t>nach</a:t>
+            </a:r>
+            <a:r>
+              <a:rPr lang="en-US" sz="2000" dirty="0" smtClean="0"/>
+              <a:t> Factory 2</a:t>
+            </a:r>
+            <a:endParaRPr lang="en-US" sz="2000" dirty="0"/>
+          </a:p>
+          <a:p>
+            <a:endParaRPr lang="en-US" sz="2000" dirty="0" smtClean="0"/>
+          </a:p>
+          <a:p>
+            <a:endParaRPr lang="en-US" sz="2000" dirty="0"/>
+          </a:p>
+        </p:txBody>
+      </p:sp>
+    </p:spTree>
+    <p:extLst>
+      <p:ext uri="{BB962C8B-B14F-4D97-AF65-F5344CB8AC3E}">
+        <p14:creationId xmlns:p14="http://schemas.microsoft.com/office/powerpoint/2010/main" val="4107216816"/>
+      </p:ext>
+    </p:extLst>
+  </p:cSld>
+  <p:clrMapOvr>
+    <a:masterClrMapping/>
+  </p:clrMapOvr>
+  <p:timing>
+    <p:tnLst>
+      <p:par>
+        <p:cTn xmlns:p14="http://schemas.microsoft.com/office/powerpoint/2010/main" id="1" dur="indefinite" restart="never" nodeType="tmRoot"/>
+      </p:par>
+    </p:tnLst>
+  </p:timing>
+</p:sld>
+</file>
+
+<file path=ppt/slides/slide4.xml><?xml version="1.0" encoding="utf-8"?>
+<p:sld xmlns:a="http://schemas.openxmlformats.org/drawingml/2006/main" xmlns:r="http://schemas.openxmlformats.org/officeDocument/2006/relationships" xmlns:p="http://schemas.openxmlformats.org/presentationml/2006/main">
+  <p:cSld>
+    <p:spTree>
+      <p:nvGrpSpPr>
+        <p:cNvPr id="1" name=""/>
+        <p:cNvGrpSpPr/>
+        <p:nvPr/>
+      </p:nvGrpSpPr>
+      <p:grpSpPr>
+        <a:xfrm>
+          <a:off x="0" y="0"/>
+          <a:ext cx="0" cy="0"/>
+          <a:chOff x="0" y="0"/>
+          <a:chExt cx="0" cy="0"/>
+        </a:xfrm>
+      </p:grpSpPr>
+      <p:sp>
+        <p:nvSpPr>
+          <p:cNvPr id="2" name="Title 1"/>
+          <p:cNvSpPr>
+            <a:spLocks noGrp="1"/>
+          </p:cNvSpPr>
+          <p:nvPr>
+            <p:ph type="title"/>
+          </p:nvPr>
+        </p:nvSpPr>
+        <p:spPr/>
+        <p:txBody>
+          <a:bodyPr/>
+          <a:lstStyle/>
+          <a:p>
+            <a:r>
+              <a:rPr lang="en-US" dirty="0" smtClean="0"/>
+              <a:t>Benchmark (SBC)</a:t>
+            </a:r>
+            <a:endParaRPr lang="en-US" dirty="0"/>
+          </a:p>
+        </p:txBody>
+      </p:sp>
+      <p:graphicFrame>
+        <p:nvGraphicFramePr>
+          <p:cNvPr id="4" name="Chart 3"/>
+          <p:cNvGraphicFramePr>
+            <a:graphicFrameLocks/>
+          </p:cNvGraphicFramePr>
+          <p:nvPr>
+            <p:extLst>
+              <p:ext uri="{D42A27DB-BD31-4B8C-83A1-F6EECF244321}">
+                <p14:modId xmlns:p14="http://schemas.microsoft.com/office/powerpoint/2010/main" val="2968001950"/>
+              </p:ext>
+            </p:extLst>
+          </p:nvPr>
+        </p:nvGraphicFramePr>
+        <p:xfrm>
+          <a:off x="3225800" y="1500451"/>
+          <a:ext cx="5461000" cy="4362450"/>
+        </p:xfrm>
+        <a:graphic>
+          <a:graphicData uri="http://schemas.openxmlformats.org/drawingml/2006/chart">
+            <c:chart xmlns:c="http://schemas.openxmlformats.org/drawingml/2006/chart" xmlns:r="http://schemas.openxmlformats.org/officeDocument/2006/relationships" r:id="rId2"/>
+          </a:graphicData>
+        </a:graphic>
+      </p:graphicFrame>
+      <p:graphicFrame>
+        <p:nvGraphicFramePr>
+          <p:cNvPr id="5" name="Table 4"/>
+          <p:cNvGraphicFramePr>
+            <a:graphicFrameLocks noGrp="1"/>
+          </p:cNvGraphicFramePr>
+          <p:nvPr>
+            <p:extLst>
+              <p:ext uri="{D42A27DB-BD31-4B8C-83A1-F6EECF244321}">
+                <p14:modId xmlns:p14="http://schemas.microsoft.com/office/powerpoint/2010/main" val="2002648305"/>
+              </p:ext>
+            </p:extLst>
+          </p:nvPr>
+        </p:nvGraphicFramePr>
+        <p:xfrm>
+          <a:off x="457199" y="1561631"/>
+          <a:ext cx="2234439" cy="1828800"/>
+        </p:xfrm>
+        <a:graphic>
+          <a:graphicData uri="http://schemas.openxmlformats.org/drawingml/2006/table">
+            <a:tbl>
+              <a:tblPr firstRow="1" bandRow="1">
+                <a:tableStyleId>{D7AC3CCA-C797-4891-BE02-D94E43425B78}</a:tableStyleId>
+              </a:tblPr>
+              <a:tblGrid>
+                <a:gridCol w="744813"/>
+                <a:gridCol w="744813"/>
+                <a:gridCol w="744813"/>
+              </a:tblGrid>
+              <a:tr h="331106">
+                <a:tc>
+                  <a:txBody>
+                    <a:bodyPr/>
+                    <a:lstStyle/>
+                    <a:p>
+                      <a:endParaRPr lang="en-US" dirty="0"/>
+                    </a:p>
+                  </a:txBody>
+                  <a:tcPr/>
+                </a:tc>
+                <a:tc>
+                  <a:txBody>
+                    <a:bodyPr/>
+                    <a:lstStyle/>
+                    <a:p>
+                      <a:r>
+                        <a:rPr lang="en-US" dirty="0" smtClean="0"/>
+                        <a:t>Run 1</a:t>
+                      </a:r>
+                      <a:endParaRPr lang="en-US" dirty="0"/>
+                    </a:p>
+                  </a:txBody>
+                  <a:tcPr/>
+                </a:tc>
+                <a:tc>
+                  <a:txBody>
+                    <a:bodyPr/>
+                    <a:lstStyle/>
+                    <a:p>
+                      <a:r>
+                        <a:rPr lang="en-US" dirty="0" smtClean="0"/>
+                        <a:t>Run 2</a:t>
+                      </a:r>
+                      <a:endParaRPr lang="en-US" dirty="0"/>
+                    </a:p>
+                  </a:txBody>
+                  <a:tcPr/>
+                </a:tc>
+              </a:tr>
+              <a:tr h="331106">
+                <a:tc>
+                  <a:txBody>
+                    <a:bodyPr/>
+                    <a:lstStyle/>
+                    <a:p>
+                      <a:r>
+                        <a:rPr lang="en-US" b="1" dirty="0" smtClean="0"/>
+                        <a:t>1 CPU</a:t>
+                      </a:r>
+                      <a:endParaRPr lang="en-US" b="1" dirty="0"/>
+                    </a:p>
+                  </a:txBody>
+                  <a:tcPr/>
+                </a:tc>
+                <a:tc>
+                  <a:txBody>
+                    <a:bodyPr/>
+                    <a:lstStyle/>
+                    <a:p>
+                      <a:r>
+                        <a:rPr lang="en-US" dirty="0" smtClean="0"/>
+                        <a:t>341</a:t>
+                      </a:r>
+                      <a:endParaRPr lang="en-US" dirty="0"/>
+                    </a:p>
+                  </a:txBody>
+                  <a:tcPr/>
+                </a:tc>
+                <a:tc>
+                  <a:txBody>
+                    <a:bodyPr/>
+                    <a:lstStyle/>
+                    <a:p>
+                      <a:r>
+                        <a:rPr lang="en-US" dirty="0" smtClean="0"/>
+                        <a:t>293</a:t>
+                      </a:r>
+                      <a:endParaRPr lang="en-US" dirty="0"/>
+                    </a:p>
+                  </a:txBody>
+                  <a:tcPr/>
+                </a:tc>
+              </a:tr>
+              <a:tr h="331106">
+                <a:tc>
+                  <a:txBody>
+                    <a:bodyPr/>
+                    <a:lstStyle/>
+                    <a:p>
+                      <a:r>
+                        <a:rPr lang="en-US" b="1" dirty="0" smtClean="0"/>
+                        <a:t>2 CPU</a:t>
+                      </a:r>
+                      <a:endParaRPr lang="en-US" b="1" dirty="0"/>
+                    </a:p>
+                  </a:txBody>
+                  <a:tcPr/>
+                </a:tc>
+                <a:tc>
+                  <a:txBody>
+                    <a:bodyPr/>
+                    <a:lstStyle/>
+                    <a:p>
+                      <a:r>
+                        <a:rPr lang="en-US" dirty="0" smtClean="0"/>
+                        <a:t>708</a:t>
+                      </a:r>
+                      <a:endParaRPr lang="en-US" dirty="0"/>
+                    </a:p>
+                  </a:txBody>
+                  <a:tcPr/>
+                </a:tc>
+                <a:tc>
+                  <a:txBody>
+                    <a:bodyPr/>
+                    <a:lstStyle/>
+                    <a:p>
+                      <a:r>
+                        <a:rPr lang="en-US" dirty="0" smtClean="0"/>
+                        <a:t>714</a:t>
+                      </a:r>
+                      <a:endParaRPr lang="en-US" dirty="0"/>
+                    </a:p>
+                  </a:txBody>
+                  <a:tcPr/>
+                </a:tc>
+              </a:tr>
+              <a:tr h="331106">
+                <a:tc>
+                  <a:txBody>
+                    <a:bodyPr/>
+                    <a:lstStyle/>
+                    <a:p>
+                      <a:r>
+                        <a:rPr lang="en-US" b="1" dirty="0" smtClean="0"/>
+                        <a:t>4 CPU</a:t>
+                      </a:r>
+                      <a:endParaRPr lang="en-US" b="1" dirty="0"/>
+                    </a:p>
+                  </a:txBody>
+                  <a:tcPr/>
+                </a:tc>
+                <a:tc>
+                  <a:txBody>
+                    <a:bodyPr/>
+                    <a:lstStyle/>
+                    <a:p>
+                      <a:r>
+                        <a:rPr lang="en-US" dirty="0" smtClean="0"/>
+                        <a:t>560</a:t>
+                      </a:r>
+                      <a:endParaRPr lang="en-US" dirty="0"/>
+                    </a:p>
+                  </a:txBody>
+                  <a:tcPr/>
+                </a:tc>
+                <a:tc>
+                  <a:txBody>
+                    <a:bodyPr/>
+                    <a:lstStyle/>
+                    <a:p>
+                      <a:r>
+                        <a:rPr lang="en-US" dirty="0" smtClean="0"/>
+                        <a:t>560</a:t>
+                      </a:r>
+                      <a:endParaRPr lang="en-US" dirty="0"/>
+                    </a:p>
+                  </a:txBody>
+                  <a:tcPr/>
+                </a:tc>
+              </a:tr>
+              <a:tr h="331106">
+                <a:tc>
+                  <a:txBody>
+                    <a:bodyPr/>
+                    <a:lstStyle/>
+                    <a:p>
+                      <a:r>
+                        <a:rPr lang="en-US" b="1" dirty="0" smtClean="0"/>
+                        <a:t>8 CPU</a:t>
+                      </a:r>
+                      <a:endParaRPr lang="en-US" b="1" dirty="0"/>
+                    </a:p>
+                  </a:txBody>
+                  <a:tcPr/>
+                </a:tc>
+                <a:tc>
+                  <a:txBody>
+                    <a:bodyPr/>
+                    <a:lstStyle/>
+                    <a:p>
+                      <a:r>
+                        <a:rPr lang="en-US" dirty="0" smtClean="0"/>
+                        <a:t>560</a:t>
+                      </a:r>
+                      <a:endParaRPr lang="en-US" dirty="0"/>
+                    </a:p>
+                  </a:txBody>
+                  <a:tcPr/>
+                </a:tc>
+                <a:tc>
+                  <a:txBody>
+                    <a:bodyPr/>
+                    <a:lstStyle/>
+                    <a:p>
+                      <a:r>
+                        <a:rPr lang="en-US" dirty="0" smtClean="0"/>
+                        <a:t>560</a:t>
+                      </a:r>
+                      <a:endParaRPr lang="en-US" dirty="0"/>
+                    </a:p>
+                  </a:txBody>
+                  <a:tcPr/>
+                </a:tc>
+              </a:tr>
+            </a:tbl>
+          </a:graphicData>
+        </a:graphic>
+      </p:graphicFrame>
+      <p:sp>
+        <p:nvSpPr>
+          <p:cNvPr id="6" name="TextBox 5"/>
+          <p:cNvSpPr txBox="1"/>
+          <p:nvPr/>
+        </p:nvSpPr>
+        <p:spPr>
+          <a:xfrm>
+            <a:off x="396172" y="3576817"/>
+            <a:ext cx="2668335" cy="2585323"/>
+          </a:xfrm>
+          <a:prstGeom prst="rect">
+            <a:avLst/>
+          </a:prstGeom>
+          <a:noFill/>
+        </p:spPr>
+        <p:txBody>
+          <a:bodyPr wrap="square" rtlCol="0">
+            <a:spAutoFit/>
+          </a:bodyPr>
+          <a:lstStyle/>
+          <a:p>
+            <a:pPr algn="just"/>
+            <a:r>
+              <a:rPr lang="en-US" b="1" dirty="0" err="1" smtClean="0"/>
+              <a:t>Conclusio</a:t>
+            </a:r>
+            <a:endParaRPr lang="en-US" b="1" dirty="0" smtClean="0"/>
+          </a:p>
+          <a:p>
+            <a:pPr algn="just"/>
+            <a:endParaRPr lang="en-US" b="1" dirty="0" smtClean="0"/>
+          </a:p>
+          <a:p>
+            <a:pPr algn="just"/>
+            <a:r>
+              <a:rPr lang="en-US" dirty="0" smtClean="0"/>
+              <a:t>Je </a:t>
+            </a:r>
+            <a:r>
+              <a:rPr lang="en-US" dirty="0" err="1" smtClean="0"/>
+              <a:t>schneller</a:t>
+            </a:r>
+            <a:r>
+              <a:rPr lang="en-US" dirty="0" smtClean="0"/>
+              <a:t> die </a:t>
+            </a:r>
+            <a:r>
+              <a:rPr lang="en-US" dirty="0" err="1" smtClean="0"/>
+              <a:t>Maschine</a:t>
+            </a:r>
+            <a:r>
+              <a:rPr lang="en-US" dirty="0" smtClean="0"/>
+              <a:t>, </a:t>
+            </a:r>
+            <a:r>
+              <a:rPr lang="en-US" dirty="0" err="1" smtClean="0"/>
+              <a:t>desto</a:t>
+            </a:r>
+            <a:r>
+              <a:rPr lang="en-US" dirty="0" smtClean="0"/>
+              <a:t> </a:t>
+            </a:r>
+            <a:r>
+              <a:rPr lang="en-US" dirty="0" err="1" smtClean="0"/>
+              <a:t>weniger</a:t>
+            </a:r>
+            <a:r>
+              <a:rPr lang="en-US" dirty="0" smtClean="0"/>
+              <a:t> </a:t>
+            </a:r>
+            <a:r>
+              <a:rPr lang="en-US" dirty="0" err="1" smtClean="0"/>
+              <a:t>kommt</a:t>
+            </a:r>
+            <a:r>
+              <a:rPr lang="en-US" dirty="0" smtClean="0"/>
+              <a:t> der </a:t>
+            </a:r>
+            <a:r>
+              <a:rPr lang="en-US" dirty="0" err="1" smtClean="0"/>
+              <a:t>LoadBalancer</a:t>
+            </a:r>
+            <a:r>
+              <a:rPr lang="en-US" dirty="0" smtClean="0"/>
+              <a:t> </a:t>
+            </a:r>
+            <a:r>
+              <a:rPr lang="en-US" dirty="0" err="1" smtClean="0"/>
+              <a:t>zum</a:t>
+            </a:r>
+            <a:r>
+              <a:rPr lang="en-US" dirty="0" smtClean="0"/>
+              <a:t> Zug.</a:t>
+            </a:r>
+          </a:p>
+          <a:p>
+            <a:pPr algn="just"/>
+            <a:endParaRPr lang="en-US" dirty="0" smtClean="0"/>
+          </a:p>
+          <a:p>
+            <a:pPr algn="just"/>
+            <a:r>
+              <a:rPr lang="en-US" dirty="0" smtClean="0">
+                <a:sym typeface="Wingdings"/>
+              </a:rPr>
+              <a:t> </a:t>
+            </a:r>
+            <a:r>
+              <a:rPr lang="en-US" dirty="0" err="1" smtClean="0">
+                <a:sym typeface="Wingdings"/>
+              </a:rPr>
+              <a:t>Bei</a:t>
+            </a:r>
+            <a:r>
+              <a:rPr lang="en-US" dirty="0" smtClean="0">
+                <a:sym typeface="Wingdings"/>
+              </a:rPr>
+              <a:t> 4 &amp; 8 CPU hat </a:t>
+            </a:r>
+            <a:r>
+              <a:rPr lang="en-US" dirty="0" err="1" smtClean="0">
+                <a:sym typeface="Wingdings"/>
+              </a:rPr>
+              <a:t>kein</a:t>
+            </a:r>
+            <a:r>
+              <a:rPr lang="en-US" dirty="0" smtClean="0">
+                <a:sym typeface="Wingdings"/>
+              </a:rPr>
+              <a:t> </a:t>
+            </a:r>
+            <a:r>
+              <a:rPr lang="en-US" dirty="0" err="1" smtClean="0">
+                <a:sym typeface="Wingdings"/>
+              </a:rPr>
+              <a:t>einziges</a:t>
+            </a:r>
+            <a:r>
+              <a:rPr lang="en-US" dirty="0" smtClean="0">
+                <a:sym typeface="Wingdings"/>
+              </a:rPr>
+              <a:t> Load Balancing </a:t>
+            </a:r>
+            <a:r>
+              <a:rPr lang="en-US" dirty="0" err="1" smtClean="0">
+                <a:sym typeface="Wingdings"/>
+              </a:rPr>
+              <a:t>stattgefunden</a:t>
+            </a:r>
+            <a:r>
+              <a:rPr lang="en-US" dirty="0" smtClean="0">
+                <a:sym typeface="Wingdings"/>
+              </a:rPr>
+              <a:t>!</a:t>
+            </a:r>
+            <a:endParaRPr lang="en-US" dirty="0"/>
+          </a:p>
+        </p:txBody>
+      </p:sp>
+    </p:spTree>
+    <p:extLst>
+      <p:ext uri="{BB962C8B-B14F-4D97-AF65-F5344CB8AC3E}">
+        <p14:creationId xmlns:p14="http://schemas.microsoft.com/office/powerpoint/2010/main" val="1169382475"/>
+      </p:ext>
+    </p:extLst>
+  </p:cSld>
+  <p:clrMapOvr>
+    <a:masterClrMapping/>
+  </p:clrMapOvr>
+  <p:timing>
+    <p:tnLst>
+      <p:par>
+        <p:cTn xmlns:p14="http://schemas.microsoft.com/office/powerpoint/2010/main" id="1" dur="indefinite" restart="never" nodeType="tmRoot"/>
+      </p:par>
+    </p:tnLst>
+  </p:timing>
+</p:sld>
+</file>
+
+<file path=ppt/slides/slide5.xml><?xml version="1.0" encoding="utf-8"?>
 <p:sld xmlns:a="http://schemas.openxmlformats.org/drawingml/2006/main" xmlns:r="http://schemas.openxmlformats.org/officeDocument/2006/relationships" xmlns:p="http://schemas.openxmlformats.org/presentationml/2006/main">
   <p:cSld>
     <p:spTree>
@@ -3910,492 +4774,13 @@
   <p:clrMapOvr>
     <a:masterClrMapping/>
   </p:clrMapOvr>
-</p:sld>
-</file>
-
-<file path=ppt/slides/slide3.xml><?xml version="1.0" encoding="utf-8"?>
-<p:sld xmlns:a="http://schemas.openxmlformats.org/drawingml/2006/main" xmlns:r="http://schemas.openxmlformats.org/officeDocument/2006/relationships" xmlns:p="http://schemas.openxmlformats.org/presentationml/2006/main">
-  <p:cSld>
-    <p:spTree>
-      <p:nvGrpSpPr>
-        <p:cNvPr id="1" name=""/>
-        <p:cNvGrpSpPr/>
-        <p:nvPr/>
-      </p:nvGrpSpPr>
-      <p:grpSpPr>
-        <a:xfrm>
-          <a:off x="0" y="0"/>
-          <a:ext cx="0" cy="0"/>
-          <a:chOff x="0" y="0"/>
-          <a:chExt cx="0" cy="0"/>
-        </a:xfrm>
-      </p:grpSpPr>
-      <p:sp>
-        <p:nvSpPr>
-          <p:cNvPr id="2" name="Title 1"/>
-          <p:cNvSpPr>
-            <a:spLocks noGrp="1"/>
-          </p:cNvSpPr>
-          <p:nvPr>
-            <p:ph type="title"/>
-          </p:nvPr>
-        </p:nvSpPr>
-        <p:spPr/>
-        <p:txBody>
-          <a:bodyPr/>
-          <a:lstStyle/>
-          <a:p>
-            <a:r>
-              <a:rPr lang="en-US" dirty="0" smtClean="0"/>
-              <a:t>Benchmark (SBC)</a:t>
-            </a:r>
-            <a:endParaRPr lang="en-US" dirty="0"/>
-          </a:p>
-        </p:txBody>
-      </p:sp>
-      <p:graphicFrame>
-        <p:nvGraphicFramePr>
-          <p:cNvPr id="4" name="Chart 3"/>
-          <p:cNvGraphicFramePr>
-            <a:graphicFrameLocks/>
-          </p:cNvGraphicFramePr>
-          <p:nvPr>
-            <p:extLst>
-              <p:ext uri="{D42A27DB-BD31-4B8C-83A1-F6EECF244321}">
-                <p14:modId xmlns:p14="http://schemas.microsoft.com/office/powerpoint/2010/main" val="2968001950"/>
-              </p:ext>
-            </p:extLst>
-          </p:nvPr>
-        </p:nvGraphicFramePr>
-        <p:xfrm>
-          <a:off x="3225800" y="1500451"/>
-          <a:ext cx="5461000" cy="4362450"/>
-        </p:xfrm>
-        <a:graphic>
-          <a:graphicData uri="http://schemas.openxmlformats.org/drawingml/2006/chart">
-            <c:chart xmlns:c="http://schemas.openxmlformats.org/drawingml/2006/chart" xmlns:r="http://schemas.openxmlformats.org/officeDocument/2006/relationships" r:id="rId2"/>
-          </a:graphicData>
-        </a:graphic>
-      </p:graphicFrame>
-      <p:graphicFrame>
-        <p:nvGraphicFramePr>
-          <p:cNvPr id="5" name="Table 4"/>
-          <p:cNvGraphicFramePr>
-            <a:graphicFrameLocks noGrp="1"/>
-          </p:cNvGraphicFramePr>
-          <p:nvPr>
-            <p:extLst>
-              <p:ext uri="{D42A27DB-BD31-4B8C-83A1-F6EECF244321}">
-                <p14:modId xmlns:p14="http://schemas.microsoft.com/office/powerpoint/2010/main" val="2002648305"/>
-              </p:ext>
-            </p:extLst>
-          </p:nvPr>
-        </p:nvGraphicFramePr>
-        <p:xfrm>
-          <a:off x="457199" y="1561631"/>
-          <a:ext cx="2234439" cy="1828800"/>
-        </p:xfrm>
-        <a:graphic>
-          <a:graphicData uri="http://schemas.openxmlformats.org/drawingml/2006/table">
-            <a:tbl>
-              <a:tblPr firstRow="1" bandRow="1">
-                <a:tableStyleId>{D7AC3CCA-C797-4891-BE02-D94E43425B78}</a:tableStyleId>
-              </a:tblPr>
-              <a:tblGrid>
-                <a:gridCol w="744813"/>
-                <a:gridCol w="744813"/>
-                <a:gridCol w="744813"/>
-              </a:tblGrid>
-              <a:tr h="331106">
-                <a:tc>
-                  <a:txBody>
-                    <a:bodyPr/>
-                    <a:lstStyle/>
-                    <a:p>
-                      <a:endParaRPr lang="en-US" dirty="0"/>
-                    </a:p>
-                  </a:txBody>
-                  <a:tcPr/>
-                </a:tc>
-                <a:tc>
-                  <a:txBody>
-                    <a:bodyPr/>
-                    <a:lstStyle/>
-                    <a:p>
-                      <a:r>
-                        <a:rPr lang="en-US" dirty="0" smtClean="0"/>
-                        <a:t>Run 1</a:t>
-                      </a:r>
-                      <a:endParaRPr lang="en-US" dirty="0"/>
-                    </a:p>
-                  </a:txBody>
-                  <a:tcPr/>
-                </a:tc>
-                <a:tc>
-                  <a:txBody>
-                    <a:bodyPr/>
-                    <a:lstStyle/>
-                    <a:p>
-                      <a:r>
-                        <a:rPr lang="en-US" dirty="0" smtClean="0"/>
-                        <a:t>Run 2</a:t>
-                      </a:r>
-                      <a:endParaRPr lang="en-US" dirty="0"/>
-                    </a:p>
-                  </a:txBody>
-                  <a:tcPr/>
-                </a:tc>
-              </a:tr>
-              <a:tr h="331106">
-                <a:tc>
-                  <a:txBody>
-                    <a:bodyPr/>
-                    <a:lstStyle/>
-                    <a:p>
-                      <a:r>
-                        <a:rPr lang="en-US" b="1" dirty="0" smtClean="0"/>
-                        <a:t>1 CPU</a:t>
-                      </a:r>
-                      <a:endParaRPr lang="en-US" b="1" dirty="0"/>
-                    </a:p>
-                  </a:txBody>
-                  <a:tcPr/>
-                </a:tc>
-                <a:tc>
-                  <a:txBody>
-                    <a:bodyPr/>
-                    <a:lstStyle/>
-                    <a:p>
-                      <a:r>
-                        <a:rPr lang="en-US" dirty="0" smtClean="0"/>
-                        <a:t>341</a:t>
-                      </a:r>
-                      <a:endParaRPr lang="en-US" dirty="0"/>
-                    </a:p>
-                  </a:txBody>
-                  <a:tcPr/>
-                </a:tc>
-                <a:tc>
-                  <a:txBody>
-                    <a:bodyPr/>
-                    <a:lstStyle/>
-                    <a:p>
-                      <a:r>
-                        <a:rPr lang="en-US" dirty="0" smtClean="0"/>
-                        <a:t>293</a:t>
-                      </a:r>
-                      <a:endParaRPr lang="en-US" dirty="0"/>
-                    </a:p>
-                  </a:txBody>
-                  <a:tcPr/>
-                </a:tc>
-              </a:tr>
-              <a:tr h="331106">
-                <a:tc>
-                  <a:txBody>
-                    <a:bodyPr/>
-                    <a:lstStyle/>
-                    <a:p>
-                      <a:r>
-                        <a:rPr lang="en-US" b="1" dirty="0" smtClean="0"/>
-                        <a:t>2 CPU</a:t>
-                      </a:r>
-                      <a:endParaRPr lang="en-US" b="1" dirty="0"/>
-                    </a:p>
-                  </a:txBody>
-                  <a:tcPr/>
-                </a:tc>
-                <a:tc>
-                  <a:txBody>
-                    <a:bodyPr/>
-                    <a:lstStyle/>
-                    <a:p>
-                      <a:r>
-                        <a:rPr lang="en-US" dirty="0" smtClean="0"/>
-                        <a:t>708</a:t>
-                      </a:r>
-                      <a:endParaRPr lang="en-US" dirty="0"/>
-                    </a:p>
-                  </a:txBody>
-                  <a:tcPr/>
-                </a:tc>
-                <a:tc>
-                  <a:txBody>
-                    <a:bodyPr/>
-                    <a:lstStyle/>
-                    <a:p>
-                      <a:r>
-                        <a:rPr lang="en-US" dirty="0" smtClean="0"/>
-                        <a:t>714</a:t>
-                      </a:r>
-                      <a:endParaRPr lang="en-US" dirty="0"/>
-                    </a:p>
-                  </a:txBody>
-                  <a:tcPr/>
-                </a:tc>
-              </a:tr>
-              <a:tr h="331106">
-                <a:tc>
-                  <a:txBody>
-                    <a:bodyPr/>
-                    <a:lstStyle/>
-                    <a:p>
-                      <a:r>
-                        <a:rPr lang="en-US" b="1" dirty="0" smtClean="0"/>
-                        <a:t>4 CPU</a:t>
-                      </a:r>
-                      <a:endParaRPr lang="en-US" b="1" dirty="0"/>
-                    </a:p>
-                  </a:txBody>
-                  <a:tcPr/>
-                </a:tc>
-                <a:tc>
-                  <a:txBody>
-                    <a:bodyPr/>
-                    <a:lstStyle/>
-                    <a:p>
-                      <a:r>
-                        <a:rPr lang="en-US" dirty="0" smtClean="0"/>
-                        <a:t>560</a:t>
-                      </a:r>
-                      <a:endParaRPr lang="en-US" dirty="0"/>
-                    </a:p>
-                  </a:txBody>
-                  <a:tcPr/>
-                </a:tc>
-                <a:tc>
-                  <a:txBody>
-                    <a:bodyPr/>
-                    <a:lstStyle/>
-                    <a:p>
-                      <a:r>
-                        <a:rPr lang="en-US" dirty="0" smtClean="0"/>
-                        <a:t>560</a:t>
-                      </a:r>
-                      <a:endParaRPr lang="en-US" dirty="0"/>
-                    </a:p>
-                  </a:txBody>
-                  <a:tcPr/>
-                </a:tc>
-              </a:tr>
-              <a:tr h="331106">
-                <a:tc>
-                  <a:txBody>
-                    <a:bodyPr/>
-                    <a:lstStyle/>
-                    <a:p>
-                      <a:r>
-                        <a:rPr lang="en-US" b="1" dirty="0" smtClean="0"/>
-                        <a:t>8 CPU</a:t>
-                      </a:r>
-                      <a:endParaRPr lang="en-US" b="1" dirty="0"/>
-                    </a:p>
-                  </a:txBody>
-                  <a:tcPr/>
-                </a:tc>
-                <a:tc>
-                  <a:txBody>
-                    <a:bodyPr/>
-                    <a:lstStyle/>
-                    <a:p>
-                      <a:r>
-                        <a:rPr lang="en-US" dirty="0" smtClean="0"/>
-                        <a:t>560</a:t>
-                      </a:r>
-                      <a:endParaRPr lang="en-US" dirty="0"/>
-                    </a:p>
-                  </a:txBody>
-                  <a:tcPr/>
-                </a:tc>
-                <a:tc>
-                  <a:txBody>
-                    <a:bodyPr/>
-                    <a:lstStyle/>
-                    <a:p>
-                      <a:r>
-                        <a:rPr lang="en-US" dirty="0" smtClean="0"/>
-                        <a:t>560</a:t>
-                      </a:r>
-                      <a:endParaRPr lang="en-US" dirty="0"/>
-                    </a:p>
-                  </a:txBody>
-                  <a:tcPr/>
-                </a:tc>
-              </a:tr>
-            </a:tbl>
-          </a:graphicData>
-        </a:graphic>
-      </p:graphicFrame>
-      <p:sp>
-        <p:nvSpPr>
-          <p:cNvPr id="6" name="TextBox 5"/>
-          <p:cNvSpPr txBox="1"/>
-          <p:nvPr/>
-        </p:nvSpPr>
-        <p:spPr>
-          <a:xfrm>
-            <a:off x="396172" y="3576817"/>
-            <a:ext cx="2668335" cy="2585323"/>
-          </a:xfrm>
-          <a:prstGeom prst="rect">
-            <a:avLst/>
-          </a:prstGeom>
-          <a:noFill/>
-        </p:spPr>
-        <p:txBody>
-          <a:bodyPr wrap="square" rtlCol="0">
-            <a:spAutoFit/>
-          </a:bodyPr>
-          <a:lstStyle/>
-          <a:p>
-            <a:pPr algn="just"/>
-            <a:r>
-              <a:rPr lang="en-US" b="1" dirty="0" err="1" smtClean="0"/>
-              <a:t>Conclusio</a:t>
-            </a:r>
-            <a:endParaRPr lang="en-US" b="1" dirty="0" smtClean="0"/>
-          </a:p>
-          <a:p>
-            <a:pPr algn="just"/>
-            <a:endParaRPr lang="en-US" b="1" dirty="0" smtClean="0"/>
-          </a:p>
-          <a:p>
-            <a:pPr algn="just"/>
-            <a:r>
-              <a:rPr lang="en-US" dirty="0" smtClean="0"/>
-              <a:t>Je </a:t>
-            </a:r>
-            <a:r>
-              <a:rPr lang="en-US" dirty="0" err="1" smtClean="0"/>
-              <a:t>schneller</a:t>
-            </a:r>
-            <a:r>
-              <a:rPr lang="en-US" dirty="0" smtClean="0"/>
-              <a:t> die </a:t>
-            </a:r>
-            <a:r>
-              <a:rPr lang="en-US" dirty="0" err="1" smtClean="0"/>
-              <a:t>Maschine</a:t>
-            </a:r>
-            <a:r>
-              <a:rPr lang="en-US" dirty="0" smtClean="0"/>
-              <a:t>, </a:t>
-            </a:r>
-            <a:r>
-              <a:rPr lang="en-US" dirty="0" err="1" smtClean="0"/>
-              <a:t>desto</a:t>
-            </a:r>
-            <a:r>
-              <a:rPr lang="en-US" dirty="0" smtClean="0"/>
-              <a:t> </a:t>
-            </a:r>
-            <a:r>
-              <a:rPr lang="en-US" dirty="0" err="1" smtClean="0"/>
-              <a:t>weniger</a:t>
-            </a:r>
-            <a:r>
-              <a:rPr lang="en-US" dirty="0" smtClean="0"/>
-              <a:t> </a:t>
-            </a:r>
-            <a:r>
-              <a:rPr lang="en-US" dirty="0" err="1" smtClean="0"/>
-              <a:t>kommt</a:t>
-            </a:r>
-            <a:r>
-              <a:rPr lang="en-US" dirty="0" smtClean="0"/>
-              <a:t> der </a:t>
-            </a:r>
-            <a:r>
-              <a:rPr lang="en-US" dirty="0" err="1" smtClean="0"/>
-              <a:t>LoadBalancer</a:t>
-            </a:r>
-            <a:r>
-              <a:rPr lang="en-US" dirty="0" smtClean="0"/>
-              <a:t> </a:t>
-            </a:r>
-            <a:r>
-              <a:rPr lang="en-US" dirty="0" err="1" smtClean="0"/>
-              <a:t>zum</a:t>
-            </a:r>
-            <a:r>
-              <a:rPr lang="en-US" dirty="0" smtClean="0"/>
-              <a:t> Zug.</a:t>
-            </a:r>
-          </a:p>
-          <a:p>
-            <a:pPr algn="just"/>
-            <a:endParaRPr lang="en-US" dirty="0" smtClean="0"/>
-          </a:p>
-          <a:p>
-            <a:pPr algn="just"/>
-            <a:r>
-              <a:rPr lang="en-US" dirty="0" smtClean="0">
-                <a:sym typeface="Wingdings"/>
-              </a:rPr>
-              <a:t> </a:t>
-            </a:r>
-            <a:r>
-              <a:rPr lang="en-US" dirty="0" err="1" smtClean="0">
-                <a:sym typeface="Wingdings"/>
-              </a:rPr>
-              <a:t>Bei</a:t>
-            </a:r>
-            <a:r>
-              <a:rPr lang="en-US" dirty="0" smtClean="0">
-                <a:sym typeface="Wingdings"/>
-              </a:rPr>
-              <a:t> 4 &amp; 8 CPU hat </a:t>
-            </a:r>
-            <a:r>
-              <a:rPr lang="en-US" dirty="0" err="1" smtClean="0">
-                <a:sym typeface="Wingdings"/>
-              </a:rPr>
-              <a:t>kein</a:t>
-            </a:r>
-            <a:r>
-              <a:rPr lang="en-US" dirty="0" smtClean="0">
-                <a:sym typeface="Wingdings"/>
-              </a:rPr>
-              <a:t> </a:t>
-            </a:r>
-            <a:r>
-              <a:rPr lang="en-US" dirty="0" err="1" smtClean="0">
-                <a:sym typeface="Wingdings"/>
-              </a:rPr>
-              <a:t>einziges</a:t>
-            </a:r>
-            <a:r>
-              <a:rPr lang="en-US" dirty="0" smtClean="0">
-                <a:sym typeface="Wingdings"/>
-              </a:rPr>
-              <a:t> Load Balancing </a:t>
-            </a:r>
-            <a:r>
-              <a:rPr lang="en-US" dirty="0" err="1" smtClean="0">
-                <a:sym typeface="Wingdings"/>
-              </a:rPr>
-              <a:t>stattgefunden</a:t>
-            </a:r>
-            <a:r>
-              <a:rPr lang="en-US" dirty="0" smtClean="0">
-                <a:sym typeface="Wingdings"/>
-              </a:rPr>
-              <a:t>!</a:t>
-            </a:r>
-            <a:endParaRPr lang="en-US" dirty="0"/>
-          </a:p>
-        </p:txBody>
-      </p:sp>
-    </p:spTree>
-    <p:extLst>
-      <p:ext uri="{BB962C8B-B14F-4D97-AF65-F5344CB8AC3E}">
-        <p14:creationId xmlns:p14="http://schemas.microsoft.com/office/powerpoint/2010/main" val="1169382475"/>
-      </p:ext>
-    </p:extLst>
-  </p:cSld>
-  <p:clrMapOvr>
-    <a:masterClrMapping/>
-  </p:clrMapOvr>
+  <p:timing>
+    <p:tnLst>
+      <p:par>
+        <p:cTn xmlns:p14="http://schemas.microsoft.com/office/powerpoint/2010/main" id="1" dur="indefinite" restart="never" nodeType="tmRoot"/>
+      </p:par>
+    </p:tnLst>
+  </p:timing>
 </p:sld>
 </file>
 

</xml_diff>